<commit_message>
update presentation with logistic model
</commit_message>
<xml_diff>
--- a/presentations/DS6306_Proj2_Final_Presentation.pptx
+++ b/presentations/DS6306_Proj2_Final_Presentation.pptx
@@ -5,7 +5,7 @@
     <p:sldMasterId id="2147483672" r:id="rId1"/>
   </p:sldMasterIdLst>
   <p:notesMasterIdLst>
-    <p:notesMasterId r:id="rId17"/>
+    <p:notesMasterId r:id="rId19"/>
   </p:notesMasterIdLst>
   <p:sldIdLst>
     <p:sldId id="580" r:id="rId2"/>
@@ -13,16 +13,18 @@
     <p:sldId id="622" r:id="rId4"/>
     <p:sldId id="621" r:id="rId5"/>
     <p:sldId id="623" r:id="rId6"/>
-    <p:sldId id="624" r:id="rId7"/>
-    <p:sldId id="637" r:id="rId8"/>
-    <p:sldId id="638" r:id="rId9"/>
-    <p:sldId id="639" r:id="rId10"/>
-    <p:sldId id="634" r:id="rId11"/>
-    <p:sldId id="640" r:id="rId12"/>
-    <p:sldId id="627" r:id="rId13"/>
-    <p:sldId id="641" r:id="rId14"/>
-    <p:sldId id="636" r:id="rId15"/>
-    <p:sldId id="526" r:id="rId16"/>
+    <p:sldId id="642" r:id="rId7"/>
+    <p:sldId id="624" r:id="rId8"/>
+    <p:sldId id="637" r:id="rId9"/>
+    <p:sldId id="643" r:id="rId10"/>
+    <p:sldId id="638" r:id="rId11"/>
+    <p:sldId id="639" r:id="rId12"/>
+    <p:sldId id="634" r:id="rId13"/>
+    <p:sldId id="640" r:id="rId14"/>
+    <p:sldId id="627" r:id="rId15"/>
+    <p:sldId id="641" r:id="rId16"/>
+    <p:sldId id="636" r:id="rId17"/>
+    <p:sldId id="526" r:id="rId18"/>
   </p:sldIdLst>
   <p:sldSz cx="9144000" cy="6858000" type="screen4x3"/>
   <p:notesSz cx="6858000" cy="9144000"/>
@@ -132,9 +134,115 @@
 <file path=ppt/revisionInfo.xml><?xml version="1.0" encoding="utf-8"?>
 <p1510:revInfo xmlns:a="http://schemas.openxmlformats.org/drawingml/2006/main" xmlns:r="http://schemas.openxmlformats.org/officeDocument/2006/relationships" xmlns:p1510="http://schemas.microsoft.com/office/powerpoint/2015/10/main">
   <p1510:revLst>
-    <p1510:client id="{65C67A5B-D439-DD4E-A637-827378D75345}" v="59" dt="2019-10-10T15:48:12.011"/>
+    <p1510:client id="{C4F7DB1D-B965-C94F-9D54-3CBEA6F86B55}" v="5" dt="2019-12-06T04:15:49.910"/>
   </p1510:revLst>
 </p1510:revInfo>
+</file>
+
+<file path=ppt/changesInfos/changesInfo1.xml><?xml version="1.0" encoding="utf-8"?>
+<pc:chgInfo xmlns:a="http://schemas.openxmlformats.org/drawingml/2006/main" xmlns:r="http://schemas.openxmlformats.org/officeDocument/2006/relationships" xmlns:ac="http://schemas.microsoft.com/office/drawing/2013/main/command" xmlns:pc="http://schemas.microsoft.com/office/powerpoint/2013/main/command">
+  <pc:docChgLst>
+    <pc:chgData name="Chance Robinson" userId="bb19d146-7742-4acb-a2e2-61160ec15f6c" providerId="ADAL" clId="{C4F7DB1D-B965-C94F-9D54-3CBEA6F86B55}"/>
+    <pc:docChg chg="undo custSel addSld modSld">
+      <pc:chgData name="Chance Robinson" userId="bb19d146-7742-4acb-a2e2-61160ec15f6c" providerId="ADAL" clId="{C4F7DB1D-B965-C94F-9D54-3CBEA6F86B55}" dt="2019-12-06T04:16:47.723" v="317" actId="113"/>
+      <pc:docMkLst>
+        <pc:docMk/>
+      </pc:docMkLst>
+      <pc:sldChg chg="modNotesTx">
+        <pc:chgData name="Chance Robinson" userId="bb19d146-7742-4acb-a2e2-61160ec15f6c" providerId="ADAL" clId="{C4F7DB1D-B965-C94F-9D54-3CBEA6F86B55}" dt="2019-12-06T04:12:36.004" v="228" actId="20577"/>
+        <pc:sldMkLst>
+          <pc:docMk/>
+          <pc:sldMk cId="170715436" sldId="622"/>
+        </pc:sldMkLst>
+      </pc:sldChg>
+      <pc:sldChg chg="modSp">
+        <pc:chgData name="Chance Robinson" userId="bb19d146-7742-4acb-a2e2-61160ec15f6c" providerId="ADAL" clId="{C4F7DB1D-B965-C94F-9D54-3CBEA6F86B55}" dt="2019-12-06T04:16:47.723" v="317" actId="113"/>
+        <pc:sldMkLst>
+          <pc:docMk/>
+          <pc:sldMk cId="1981835246" sldId="636"/>
+        </pc:sldMkLst>
+        <pc:spChg chg="mod">
+          <ac:chgData name="Chance Robinson" userId="bb19d146-7742-4acb-a2e2-61160ec15f6c" providerId="ADAL" clId="{C4F7DB1D-B965-C94F-9D54-3CBEA6F86B55}" dt="2019-12-06T04:16:47.723" v="317" actId="113"/>
+          <ac:spMkLst>
+            <pc:docMk/>
+            <pc:sldMk cId="1981835246" sldId="636"/>
+            <ac:spMk id="8" creationId="{4642B19D-3DF3-4F9F-B645-7D34C2B298DB}"/>
+          </ac:spMkLst>
+        </pc:spChg>
+      </pc:sldChg>
+      <pc:sldChg chg="modSp">
+        <pc:chgData name="Chance Robinson" userId="bb19d146-7742-4acb-a2e2-61160ec15f6c" providerId="ADAL" clId="{C4F7DB1D-B965-C94F-9D54-3CBEA6F86B55}" dt="2019-12-06T04:11:28.459" v="184" actId="255"/>
+        <pc:sldMkLst>
+          <pc:docMk/>
+          <pc:sldMk cId="145167019" sldId="642"/>
+        </pc:sldMkLst>
+        <pc:spChg chg="mod">
+          <ac:chgData name="Chance Robinson" userId="bb19d146-7742-4acb-a2e2-61160ec15f6c" providerId="ADAL" clId="{C4F7DB1D-B965-C94F-9D54-3CBEA6F86B55}" dt="2019-12-06T04:11:28.459" v="184" actId="255"/>
+          <ac:spMkLst>
+            <pc:docMk/>
+            <pc:sldMk cId="145167019" sldId="642"/>
+            <ac:spMk id="3" creationId="{BAB8A5B3-BF76-4015-AE68-D812260929BA}"/>
+          </ac:spMkLst>
+        </pc:spChg>
+      </pc:sldChg>
+      <pc:sldChg chg="addSp delSp modSp add">
+        <pc:chgData name="Chance Robinson" userId="bb19d146-7742-4acb-a2e2-61160ec15f6c" providerId="ADAL" clId="{C4F7DB1D-B965-C94F-9D54-3CBEA6F86B55}" dt="2019-12-06T04:15:09.906" v="305" actId="20577"/>
+        <pc:sldMkLst>
+          <pc:docMk/>
+          <pc:sldMk cId="2116266125" sldId="643"/>
+        </pc:sldMkLst>
+        <pc:spChg chg="mod">
+          <ac:chgData name="Chance Robinson" userId="bb19d146-7742-4acb-a2e2-61160ec15f6c" providerId="ADAL" clId="{C4F7DB1D-B965-C94F-9D54-3CBEA6F86B55}" dt="2019-12-06T04:13:02.516" v="248" actId="20577"/>
+          <ac:spMkLst>
+            <pc:docMk/>
+            <pc:sldMk cId="2116266125" sldId="643"/>
+            <ac:spMk id="2" creationId="{5B931770-76C9-F749-9B7D-08A4A1F13896}"/>
+          </ac:spMkLst>
+        </pc:spChg>
+        <pc:spChg chg="mod">
+          <ac:chgData name="Chance Robinson" userId="bb19d146-7742-4acb-a2e2-61160ec15f6c" providerId="ADAL" clId="{C4F7DB1D-B965-C94F-9D54-3CBEA6F86B55}" dt="2019-12-06T04:15:09.906" v="305" actId="20577"/>
+          <ac:spMkLst>
+            <pc:docMk/>
+            <pc:sldMk cId="2116266125" sldId="643"/>
+            <ac:spMk id="4" creationId="{6608DBBE-C619-4CEB-9667-544ECD27A105}"/>
+          </ac:spMkLst>
+        </pc:spChg>
+        <pc:picChg chg="add mod">
+          <ac:chgData name="Chance Robinson" userId="bb19d146-7742-4acb-a2e2-61160ec15f6c" providerId="ADAL" clId="{C4F7DB1D-B965-C94F-9D54-3CBEA6F86B55}" dt="2019-12-06T04:14:17.972" v="251" actId="1076"/>
+          <ac:picMkLst>
+            <pc:docMk/>
+            <pc:sldMk cId="2116266125" sldId="643"/>
+            <ac:picMk id="3" creationId="{4FF90320-1147-4743-A362-A2C1AADD4658}"/>
+          </ac:picMkLst>
+        </pc:picChg>
+        <pc:picChg chg="add mod">
+          <ac:chgData name="Chance Robinson" userId="bb19d146-7742-4acb-a2e2-61160ec15f6c" providerId="ADAL" clId="{C4F7DB1D-B965-C94F-9D54-3CBEA6F86B55}" dt="2019-12-06T04:14:45.160" v="254" actId="1076"/>
+          <ac:picMkLst>
+            <pc:docMk/>
+            <pc:sldMk cId="2116266125" sldId="643"/>
+            <ac:picMk id="6" creationId="{61BBCCAE-8BA9-5D4A-9461-4B20A057B74D}"/>
+          </ac:picMkLst>
+        </pc:picChg>
+        <pc:picChg chg="del">
+          <ac:chgData name="Chance Robinson" userId="bb19d146-7742-4acb-a2e2-61160ec15f6c" providerId="ADAL" clId="{C4F7DB1D-B965-C94F-9D54-3CBEA6F86B55}" dt="2019-12-06T04:14:11.878" v="249" actId="478"/>
+          <ac:picMkLst>
+            <pc:docMk/>
+            <pc:sldMk cId="2116266125" sldId="643"/>
+            <ac:picMk id="7" creationId="{1348F902-6A30-2F42-B539-35D0BB7331EC}"/>
+          </ac:picMkLst>
+        </pc:picChg>
+        <pc:picChg chg="del">
+          <ac:chgData name="Chance Robinson" userId="bb19d146-7742-4acb-a2e2-61160ec15f6c" providerId="ADAL" clId="{C4F7DB1D-B965-C94F-9D54-3CBEA6F86B55}" dt="2019-12-06T04:14:41.836" v="252" actId="478"/>
+          <ac:picMkLst>
+            <pc:docMk/>
+            <pc:sldMk cId="2116266125" sldId="643"/>
+            <ac:picMk id="8" creationId="{9D8CE489-8716-DB48-AF85-6782456806EB}"/>
+          </ac:picMkLst>
+        </pc:picChg>
+      </pc:sldChg>
+    </pc:docChg>
+  </pc:docChgLst>
+</pc:chgInfo>
 </file>
 
 <file path=ppt/notesMasters/notesMaster1.xml><?xml version="1.0" encoding="utf-8"?>
@@ -547,36 +655,7 @@
               <a:tabLst/>
               <a:defRPr/>
             </a:pPr>
-            <a:r>
-              <a:rPr lang="en-US" i="1" dirty="0"/>
-              <a:t>2,410 US craft beers</a:t>
-            </a:r>
-          </a:p>
-          <a:p>
-            <a:pPr marL="0" marR="0" lvl="0" indent="0" algn="l" defTabSz="914400" rtl="0" eaLnBrk="1" fontAlgn="auto" latinLnBrk="0" hangingPunct="1">
-              <a:lnSpc>
-                <a:spcPct val="100000"/>
-              </a:lnSpc>
-              <a:spcBef>
-                <a:spcPts val="0"/>
-              </a:spcBef>
-              <a:spcAft>
-                <a:spcPts val="0"/>
-              </a:spcAft>
-              <a:buClrTx/>
-              <a:buSzTx/>
-              <a:buFontTx/>
-              <a:buNone/>
-              <a:tabLst/>
-              <a:defRPr/>
-            </a:pPr>
-            <a:r>
-              <a:rPr lang="en-US" i="1" dirty="0"/>
-              <a:t>558 US craft breweries</a:t>
-            </a:r>
-          </a:p>
-          <a:p>
-            <a:endParaRPr lang="en-US" dirty="0"/>
+            <a:endParaRPr lang="en-US" i="1" dirty="0"/>
           </a:p>
         </p:txBody>
       </p:sp>
@@ -693,7 +772,7 @@
           <a:p>
             <a:fld id="{1B0D91D7-F22D-4CDC-8F75-E7F369B9B3B7}" type="slidenum">
               <a:rPr lang="en-US" smtClean="0"/>
-              <a:t>10</a:t>
+              <a:t>12</a:t>
             </a:fld>
             <a:endParaRPr lang="en-US"/>
           </a:p>
@@ -805,7 +884,7 @@
           <a:p>
             <a:fld id="{1B0D91D7-F22D-4CDC-8F75-E7F369B9B3B7}" type="slidenum">
               <a:rPr lang="en-US" smtClean="0"/>
-              <a:t>11</a:t>
+              <a:t>13</a:t>
             </a:fld>
             <a:endParaRPr lang="en-US"/>
           </a:p>
@@ -3093,7 +3172,7 @@
           <a:p>
             <a:r>
               <a:rPr lang="en-US" dirty="0"/>
-              <a:t>Variable Importance</a:t>
+              <a:t>Random Forest</a:t>
             </a:r>
           </a:p>
         </p:txBody>
@@ -3116,70 +3195,14 @@
         </p:nvSpPr>
         <p:spPr>
           <a:xfrm>
-            <a:off x="3313269" y="1756064"/>
-            <a:ext cx="5232953" cy="4423064"/>
+            <a:off x="457199" y="1627905"/>
+            <a:ext cx="8229600" cy="4854011"/>
           </a:xfrm>
         </p:spPr>
         <p:txBody>
           <a:bodyPr/>
           <a:lstStyle/>
           <a:p>
-            <a:r>
-              <a:rPr lang="en-US" sz="2800" dirty="0"/>
-              <a:t>Some models were capable of detecting which variables factored in most to the predictive accuracy of the given model</a:t>
-            </a:r>
-          </a:p>
-          <a:p>
-            <a:pPr lvl="1">
-              <a:buFont typeface="Wingdings" pitchFamily="2" charset="2"/>
-              <a:buChar char="q"/>
-            </a:pPr>
-            <a:r>
-              <a:rPr lang="en-US" sz="2000" dirty="0"/>
-              <a:t>Stock Option Level</a:t>
-            </a:r>
-          </a:p>
-          <a:p>
-            <a:pPr lvl="1">
-              <a:buFont typeface="Wingdings" pitchFamily="2" charset="2"/>
-              <a:buChar char="q"/>
-            </a:pPr>
-            <a:r>
-              <a:rPr lang="en-US" sz="2000" dirty="0"/>
-              <a:t>Overtime</a:t>
-            </a:r>
-          </a:p>
-          <a:p>
-            <a:pPr lvl="1">
-              <a:buFont typeface="Wingdings" pitchFamily="2" charset="2"/>
-              <a:buChar char="q"/>
-            </a:pPr>
-            <a:r>
-              <a:rPr lang="en-US" sz="2000" dirty="0"/>
-              <a:t>Job Role</a:t>
-            </a:r>
-          </a:p>
-          <a:p>
-            <a:pPr lvl="1">
-              <a:buFont typeface="Wingdings" pitchFamily="2" charset="2"/>
-              <a:buChar char="q"/>
-            </a:pPr>
-            <a:r>
-              <a:rPr lang="en-US" sz="2000" dirty="0"/>
-              <a:t>Age</a:t>
-            </a:r>
-          </a:p>
-          <a:p>
-            <a:pPr lvl="1">
-              <a:buFont typeface="Wingdings" pitchFamily="2" charset="2"/>
-              <a:buChar char="q"/>
-            </a:pPr>
-            <a:r>
-              <a:rPr lang="en-US" sz="2000" dirty="0"/>
-              <a:t>Distance from Home</a:t>
-            </a:r>
-          </a:p>
-          <a:p>
             <a:endParaRPr lang="en-US" dirty="0"/>
           </a:p>
           <a:p>
@@ -3194,32 +3217,87 @@
           <a:p>
             <a:endParaRPr lang="en-US" dirty="0"/>
           </a:p>
-          <a:p>
-            <a:pPr marL="0" indent="0">
-              <a:buNone/>
-            </a:pPr>
-            <a:endParaRPr lang="en-US" sz="1600" i="1" dirty="0"/>
-          </a:p>
-          <a:p>
-            <a:pPr marL="0" indent="0">
-              <a:buNone/>
-            </a:pPr>
-            <a:endParaRPr lang="en-US" dirty="0"/>
-          </a:p>
-          <a:p>
-            <a:pPr marL="0" indent="0">
-              <a:buNone/>
-            </a:pPr>
-            <a:endParaRPr lang="en-US" dirty="0"/>
+        </p:txBody>
+      </p:sp>
+      <p:sp>
+        <p:nvSpPr>
+          <p:cNvPr id="4" name="Rectangle 3">
+            <a:extLst>
+              <a:ext uri="{FF2B5EF4-FFF2-40B4-BE49-F238E27FC236}">
+                <a16:creationId xmlns:a16="http://schemas.microsoft.com/office/drawing/2014/main" id="{6608DBBE-C619-4CEB-9667-544ECD27A105}"/>
+              </a:ext>
+            </a:extLst>
+          </p:cNvPr>
+          <p:cNvSpPr/>
+          <p:nvPr/>
+        </p:nvSpPr>
+        <p:spPr>
+          <a:xfrm>
+            <a:off x="190366" y="5835585"/>
+            <a:ext cx="8763265" cy="646331"/>
+          </a:xfrm>
+          <a:prstGeom prst="rect">
+            <a:avLst/>
+          </a:prstGeom>
+        </p:spPr>
+        <p:txBody>
+          <a:bodyPr wrap="square">
+            <a:spAutoFit/>
+          </a:bodyPr>
+          <a:lstStyle/>
+          <a:p>
+            <a:r>
+              <a:rPr lang="en-US" i="1" dirty="0"/>
+              <a:t>With the same 70/30 train-test split with the random forest model had an AUC of </a:t>
+            </a:r>
+            <a:r>
+              <a:rPr lang="en-US" i="1" dirty="0">
+                <a:highlight>
+                  <a:srgbClr val="FFFF00"/>
+                </a:highlight>
+              </a:rPr>
+              <a:t>0.7378</a:t>
+            </a:r>
+            <a:endParaRPr lang="en-US" i="1" dirty="0"/>
           </a:p>
         </p:txBody>
       </p:sp>
       <p:pic>
         <p:nvPicPr>
-          <p:cNvPr id="4" name="Picture 3">
+          <p:cNvPr id="7" name="Picture 6">
             <a:extLst>
               <a:ext uri="{FF2B5EF4-FFF2-40B4-BE49-F238E27FC236}">
-                <a16:creationId xmlns:a16="http://schemas.microsoft.com/office/drawing/2014/main" id="{76766C49-F879-7843-94DC-6D3F32EB7427}"/>
+                <a16:creationId xmlns:a16="http://schemas.microsoft.com/office/drawing/2014/main" id="{09D73BFC-E171-9C41-B0E6-660F3C351C36}"/>
+              </a:ext>
+            </a:extLst>
+          </p:cNvPr>
+          <p:cNvPicPr>
+            <a:picLocks noChangeAspect="1"/>
+          </p:cNvPicPr>
+          <p:nvPr/>
+        </p:nvPicPr>
+        <p:blipFill>
+          <a:blip r:embed="rId2"/>
+          <a:stretch>
+            <a:fillRect/>
+          </a:stretch>
+        </p:blipFill>
+        <p:spPr>
+          <a:xfrm>
+            <a:off x="5689599" y="1588929"/>
+            <a:ext cx="2997200" cy="3924300"/>
+          </a:xfrm>
+          <a:prstGeom prst="rect">
+            <a:avLst/>
+          </a:prstGeom>
+        </p:spPr>
+      </p:pic>
+      <p:pic>
+        <p:nvPicPr>
+          <p:cNvPr id="8" name="Picture 7">
+            <a:extLst>
+              <a:ext uri="{FF2B5EF4-FFF2-40B4-BE49-F238E27FC236}">
+                <a16:creationId xmlns:a16="http://schemas.microsoft.com/office/drawing/2014/main" id="{AB156359-3B63-5B4A-9390-6BD73FA3AB84}"/>
               </a:ext>
             </a:extLst>
           </p:cNvPr>
@@ -3236,8 +3314,8 @@
         </p:blipFill>
         <p:spPr>
           <a:xfrm>
-            <a:off x="597778" y="1756064"/>
-            <a:ext cx="2387600" cy="4038600"/>
+            <a:off x="457199" y="1588929"/>
+            <a:ext cx="4826000" cy="3162300"/>
           </a:xfrm>
           <a:prstGeom prst="rect">
             <a:avLst/>
@@ -3247,7 +3325,7 @@
     </p:spTree>
     <p:extLst>
       <p:ext uri="{BB962C8B-B14F-4D97-AF65-F5344CB8AC3E}">
-        <p14:creationId xmlns:p14="http://schemas.microsoft.com/office/powerpoint/2010/main" val="1289980205"/>
+        <p14:creationId xmlns:p14="http://schemas.microsoft.com/office/powerpoint/2010/main" val="2475897239"/>
       </p:ext>
     </p:extLst>
   </p:cSld>
@@ -3302,17 +3380,59 @@
           <a:p>
             <a:r>
               <a:rPr lang="en-US" dirty="0"/>
-              <a:t>Salary Predictions</a:t>
+              <a:t>Support Vector Machines</a:t>
             </a:r>
           </a:p>
         </p:txBody>
       </p:sp>
       <p:sp>
         <p:nvSpPr>
-          <p:cNvPr id="7" name="Rectangle 6">
+          <p:cNvPr id="5" name="Content Placeholder 4">
             <a:extLst>
               <a:ext uri="{FF2B5EF4-FFF2-40B4-BE49-F238E27FC236}">
-                <a16:creationId xmlns:a16="http://schemas.microsoft.com/office/drawing/2014/main" id="{5958EAC4-08F2-4945-9F0D-E088897A9830}"/>
+                <a16:creationId xmlns:a16="http://schemas.microsoft.com/office/drawing/2014/main" id="{375CDB98-7F05-41AD-9F29-81E3D0CFBEFF}"/>
+              </a:ext>
+            </a:extLst>
+          </p:cNvPr>
+          <p:cNvSpPr>
+            <a:spLocks noGrp="1"/>
+          </p:cNvSpPr>
+          <p:nvPr>
+            <p:ph idx="1"/>
+          </p:nvPr>
+        </p:nvSpPr>
+        <p:spPr>
+          <a:xfrm>
+            <a:off x="457199" y="1627905"/>
+            <a:ext cx="8229600" cy="4854011"/>
+          </a:xfrm>
+        </p:spPr>
+        <p:txBody>
+          <a:bodyPr/>
+          <a:lstStyle/>
+          <a:p>
+            <a:endParaRPr lang="en-US" dirty="0"/>
+          </a:p>
+          <a:p>
+            <a:endParaRPr lang="en-US" dirty="0"/>
+          </a:p>
+          <a:p>
+            <a:endParaRPr lang="en-US" dirty="0"/>
+          </a:p>
+          <a:p>
+            <a:endParaRPr lang="en-US" dirty="0"/>
+          </a:p>
+          <a:p>
+            <a:endParaRPr lang="en-US" dirty="0"/>
+          </a:p>
+        </p:txBody>
+      </p:sp>
+      <p:sp>
+        <p:nvSpPr>
+          <p:cNvPr id="4" name="Rectangle 3">
+            <a:extLst>
+              <a:ext uri="{FF2B5EF4-FFF2-40B4-BE49-F238E27FC236}">
+                <a16:creationId xmlns:a16="http://schemas.microsoft.com/office/drawing/2014/main" id="{6608DBBE-C619-4CEB-9667-544ECD27A105}"/>
               </a:ext>
             </a:extLst>
           </p:cNvPr>
@@ -3321,8 +3441,8 @@
         </p:nvSpPr>
         <p:spPr>
           <a:xfrm>
-            <a:off x="1505577" y="5257799"/>
-            <a:ext cx="1696614" cy="369332"/>
+            <a:off x="190366" y="5835585"/>
+            <a:ext cx="8763265" cy="646331"/>
           </a:xfrm>
           <a:prstGeom prst="rect">
             <a:avLst/>
@@ -3336,8 +3456,17 @@
           <a:p>
             <a:r>
               <a:rPr lang="en-US" i="1" dirty="0"/>
-              <a:t>Residual Plots</a:t>
-            </a:r>
+              <a:t>And finally, we have the results for the best performing model with an AUC of  </a:t>
+            </a:r>
+            <a:r>
+              <a:rPr lang="en-US" i="1" dirty="0">
+                <a:highlight>
+                  <a:srgbClr val="FFFF00"/>
+                </a:highlight>
+              </a:rPr>
+              <a:t>0.7502.</a:t>
+            </a:r>
+            <a:endParaRPr lang="en-US" i="1" dirty="0"/>
           </a:p>
         </p:txBody>
       </p:sp>
@@ -3346,7 +3475,37 @@
           <p:cNvPr id="3" name="Picture 2">
             <a:extLst>
               <a:ext uri="{FF2B5EF4-FFF2-40B4-BE49-F238E27FC236}">
-                <a16:creationId xmlns:a16="http://schemas.microsoft.com/office/drawing/2014/main" id="{CFB1D0D0-9834-5145-886D-EF7B3034B010}"/>
+                <a16:creationId xmlns:a16="http://schemas.microsoft.com/office/drawing/2014/main" id="{35D9F868-0D9A-1D46-B39E-F4B8A0F81E35}"/>
+              </a:ext>
+            </a:extLst>
+          </p:cNvPr>
+          <p:cNvPicPr>
+            <a:picLocks noChangeAspect="1"/>
+          </p:cNvPicPr>
+          <p:nvPr/>
+        </p:nvPicPr>
+        <p:blipFill>
+          <a:blip r:embed="rId2"/>
+          <a:stretch>
+            <a:fillRect/>
+          </a:stretch>
+        </p:blipFill>
+        <p:spPr>
+          <a:xfrm>
+            <a:off x="5651499" y="1578780"/>
+            <a:ext cx="3035300" cy="4000500"/>
+          </a:xfrm>
+          <a:prstGeom prst="rect">
+            <a:avLst/>
+          </a:prstGeom>
+        </p:spPr>
+      </p:pic>
+      <p:pic>
+        <p:nvPicPr>
+          <p:cNvPr id="6" name="Picture 5">
+            <a:extLst>
+              <a:ext uri="{FF2B5EF4-FFF2-40B4-BE49-F238E27FC236}">
+                <a16:creationId xmlns:a16="http://schemas.microsoft.com/office/drawing/2014/main" id="{D4F0BB1A-F258-3345-9B5A-2A9C572764E9}"/>
               </a:ext>
             </a:extLst>
           </p:cNvPr>
@@ -3363,115 +3522,18 @@
         </p:blipFill>
         <p:spPr>
           <a:xfrm>
-            <a:off x="228365" y="2459184"/>
-            <a:ext cx="4251039" cy="2633677"/>
+            <a:off x="457199" y="1578780"/>
+            <a:ext cx="4851400" cy="3086100"/>
           </a:xfrm>
           <a:prstGeom prst="rect">
             <a:avLst/>
           </a:prstGeom>
         </p:spPr>
       </p:pic>
-      <p:sp>
-        <p:nvSpPr>
-          <p:cNvPr id="6" name="Content Placeholder 5">
-            <a:extLst>
-              <a:ext uri="{FF2B5EF4-FFF2-40B4-BE49-F238E27FC236}">
-                <a16:creationId xmlns:a16="http://schemas.microsoft.com/office/drawing/2014/main" id="{609EE888-CDA0-C44C-9596-E1505292E2BB}"/>
-              </a:ext>
-            </a:extLst>
-          </p:cNvPr>
-          <p:cNvSpPr>
-            <a:spLocks noGrp="1"/>
-          </p:cNvSpPr>
-          <p:nvPr>
-            <p:ph idx="1"/>
-          </p:nvPr>
-        </p:nvSpPr>
-        <p:spPr>
-          <a:xfrm>
-            <a:off x="457200" y="1600201"/>
-            <a:ext cx="5237018" cy="630382"/>
-          </a:xfrm>
-        </p:spPr>
-        <p:txBody>
-          <a:bodyPr/>
-          <a:lstStyle/>
-          <a:p>
-            <a:r>
-              <a:rPr lang="en-US" dirty="0"/>
-              <a:t>Assumption Checking</a:t>
-            </a:r>
-          </a:p>
-        </p:txBody>
-      </p:sp>
-      <p:pic>
-        <p:nvPicPr>
-          <p:cNvPr id="8" name="Picture 7">
-            <a:extLst>
-              <a:ext uri="{FF2B5EF4-FFF2-40B4-BE49-F238E27FC236}">
-                <a16:creationId xmlns:a16="http://schemas.microsoft.com/office/drawing/2014/main" id="{72329511-034D-9E4D-8F48-131D753893B8}"/>
-              </a:ext>
-            </a:extLst>
-          </p:cNvPr>
-          <p:cNvPicPr>
-            <a:picLocks noChangeAspect="1"/>
-          </p:cNvPicPr>
-          <p:nvPr/>
-        </p:nvPicPr>
-        <p:blipFill>
-          <a:blip r:embed="rId4"/>
-          <a:stretch>
-            <a:fillRect/>
-          </a:stretch>
-        </p:blipFill>
-        <p:spPr>
-          <a:xfrm>
-            <a:off x="4664599" y="2459185"/>
-            <a:ext cx="3970116" cy="2639532"/>
-          </a:xfrm>
-          <a:prstGeom prst="rect">
-            <a:avLst/>
-          </a:prstGeom>
-        </p:spPr>
-      </p:pic>
-      <p:sp>
-        <p:nvSpPr>
-          <p:cNvPr id="9" name="Rectangle 8">
-            <a:extLst>
-              <a:ext uri="{FF2B5EF4-FFF2-40B4-BE49-F238E27FC236}">
-                <a16:creationId xmlns:a16="http://schemas.microsoft.com/office/drawing/2014/main" id="{F30B2734-644D-F042-8B09-5FDFD816578E}"/>
-              </a:ext>
-            </a:extLst>
-          </p:cNvPr>
-          <p:cNvSpPr/>
-          <p:nvPr/>
-        </p:nvSpPr>
-        <p:spPr>
-          <a:xfrm>
-            <a:off x="4705110" y="5257799"/>
-            <a:ext cx="3889093" cy="369332"/>
-          </a:xfrm>
-          <a:prstGeom prst="rect">
-            <a:avLst/>
-          </a:prstGeom>
-        </p:spPr>
-        <p:txBody>
-          <a:bodyPr wrap="square">
-            <a:spAutoFit/>
-          </a:bodyPr>
-          <a:lstStyle/>
-          <a:p>
-            <a:r>
-              <a:rPr lang="en-US" i="1" dirty="0"/>
-              <a:t>Outliers and Leverage Points</a:t>
-            </a:r>
-          </a:p>
-        </p:txBody>
-      </p:sp>
     </p:spTree>
     <p:extLst>
       <p:ext uri="{BB962C8B-B14F-4D97-AF65-F5344CB8AC3E}">
-        <p14:creationId xmlns:p14="http://schemas.microsoft.com/office/powerpoint/2010/main" val="1040865318"/>
+        <p14:creationId xmlns:p14="http://schemas.microsoft.com/office/powerpoint/2010/main" val="2813423294"/>
       </p:ext>
     </p:extLst>
   </p:cSld>
@@ -3526,7 +3588,7 @@
           <a:p>
             <a:r>
               <a:rPr lang="en-US" dirty="0"/>
-              <a:t>Multiple Linear Regression</a:t>
+              <a:t>Variable Importance</a:t>
             </a:r>
           </a:p>
         </p:txBody>
@@ -3549,83 +3611,78 @@
         </p:nvSpPr>
         <p:spPr>
           <a:xfrm>
-            <a:off x="335666" y="2160341"/>
-            <a:ext cx="8351133" cy="4321575"/>
+            <a:off x="3313269" y="1756064"/>
+            <a:ext cx="5232953" cy="4423064"/>
           </a:xfrm>
         </p:spPr>
         <p:txBody>
           <a:bodyPr/>
           <a:lstStyle/>
           <a:p>
-            <a:pPr marL="0" indent="0">
-              <a:buNone/>
-            </a:pPr>
-            <a:r>
-              <a:rPr lang="en-US" dirty="0"/>
-              <a:t>Reduced Model</a:t>
-            </a:r>
-          </a:p>
-          <a:p>
-            <a:pPr>
+            <a:r>
+              <a:rPr lang="en-US" sz="2800" dirty="0"/>
+              <a:t>Some models were capable of detecting which variables factored in most to the predictive accuracy of the given model</a:t>
+            </a:r>
+          </a:p>
+          <a:p>
+            <a:pPr lvl="1">
               <a:buFont typeface="Wingdings" pitchFamily="2" charset="2"/>
               <a:buChar char="q"/>
             </a:pPr>
             <a:r>
               <a:rPr lang="en-US" sz="2000" dirty="0"/>
-              <a:t>Business Travel</a:t>
-            </a:r>
-          </a:p>
-          <a:p>
-            <a:pPr>
+              <a:t>Stock Option Level</a:t>
+            </a:r>
+          </a:p>
+          <a:p>
+            <a:pPr lvl="1">
               <a:buFont typeface="Wingdings" pitchFamily="2" charset="2"/>
               <a:buChar char="q"/>
             </a:pPr>
             <a:r>
               <a:rPr lang="en-US" sz="2000" dirty="0"/>
-              <a:t>Daily Rate</a:t>
-            </a:r>
-          </a:p>
-          <a:p>
-            <a:pPr>
+              <a:t>Job Role</a:t>
+            </a:r>
+          </a:p>
+          <a:p>
+            <a:pPr lvl="1">
               <a:buFont typeface="Wingdings" pitchFamily="2" charset="2"/>
               <a:buChar char="q"/>
             </a:pPr>
             <a:r>
               <a:rPr lang="en-US" sz="2000" dirty="0"/>
-              <a:t>Job Level</a:t>
-            </a:r>
-          </a:p>
-          <a:p>
-            <a:pPr>
+              <a:t>Overtime</a:t>
+            </a:r>
+          </a:p>
+          <a:p>
+            <a:pPr lvl="1">
               <a:buFont typeface="Wingdings" pitchFamily="2" charset="2"/>
               <a:buChar char="q"/>
             </a:pPr>
             <a:r>
               <a:rPr lang="en-US" sz="2000" dirty="0"/>
-              <a:t>Job Role</a:t>
-            </a:r>
-          </a:p>
-          <a:p>
-            <a:pPr>
+              <a:t>Age</a:t>
+            </a:r>
+          </a:p>
+          <a:p>
+            <a:pPr lvl="1">
               <a:buFont typeface="Wingdings" pitchFamily="2" charset="2"/>
               <a:buChar char="q"/>
             </a:pPr>
             <a:r>
               <a:rPr lang="en-US" sz="2000" dirty="0"/>
-              <a:t>Total Working Years</a:t>
-            </a:r>
-          </a:p>
-          <a:p>
-            <a:pPr marL="0" indent="0">
-              <a:buNone/>
+              <a:t>Distance from Home</a:t>
+            </a:r>
+          </a:p>
+          <a:p>
+            <a:pPr lvl="1">
+              <a:buFont typeface="Wingdings" pitchFamily="2" charset="2"/>
+              <a:buChar char="q"/>
             </a:pPr>
-            <a:endParaRPr lang="en-US" dirty="0"/>
-          </a:p>
-          <a:p>
-            <a:pPr marL="0" indent="0">
-              <a:buNone/>
-            </a:pPr>
-            <a:endParaRPr lang="en-US" dirty="0"/>
+            <a:r>
+              <a:rPr lang="en-US" sz="2000" dirty="0"/>
+              <a:t>Training Times Last Year</a:t>
+            </a:r>
           </a:p>
           <a:p>
             <a:endParaRPr lang="en-US" dirty="0"/>
@@ -3667,7 +3724,7 @@
           <p:cNvPr id="4" name="Picture 3">
             <a:extLst>
               <a:ext uri="{FF2B5EF4-FFF2-40B4-BE49-F238E27FC236}">
-                <a16:creationId xmlns:a16="http://schemas.microsoft.com/office/drawing/2014/main" id="{5DA5C174-3987-A54B-AFE3-8E882D1DF1F5}"/>
+                <a16:creationId xmlns:a16="http://schemas.microsoft.com/office/drawing/2014/main" id="{76766C49-F879-7843-94DC-6D3F32EB7427}"/>
               </a:ext>
             </a:extLst>
           </p:cNvPr>
@@ -3677,15 +3734,15 @@
           <p:nvPr/>
         </p:nvPicPr>
         <p:blipFill>
-          <a:blip r:embed="rId2"/>
+          <a:blip r:embed="rId3"/>
           <a:stretch>
             <a:fillRect/>
           </a:stretch>
         </p:blipFill>
         <p:spPr>
           <a:xfrm>
-            <a:off x="3871730" y="2160341"/>
-            <a:ext cx="4710886" cy="3622969"/>
+            <a:off x="597778" y="1756064"/>
+            <a:ext cx="2387600" cy="4038600"/>
           </a:xfrm>
           <a:prstGeom prst="rect">
             <a:avLst/>
@@ -3695,7 +3752,7 @@
     </p:spTree>
     <p:extLst>
       <p:ext uri="{BB962C8B-B14F-4D97-AF65-F5344CB8AC3E}">
-        <p14:creationId xmlns:p14="http://schemas.microsoft.com/office/powerpoint/2010/main" val="724258878"/>
+        <p14:creationId xmlns:p14="http://schemas.microsoft.com/office/powerpoint/2010/main" val="1289980205"/>
       </p:ext>
     </p:extLst>
   </p:cSld>
@@ -3750,6 +3807,454 @@
           <a:p>
             <a:r>
               <a:rPr lang="en-US" dirty="0"/>
+              <a:t>Salary Predictions</a:t>
+            </a:r>
+          </a:p>
+        </p:txBody>
+      </p:sp>
+      <p:sp>
+        <p:nvSpPr>
+          <p:cNvPr id="7" name="Rectangle 6">
+            <a:extLst>
+              <a:ext uri="{FF2B5EF4-FFF2-40B4-BE49-F238E27FC236}">
+                <a16:creationId xmlns:a16="http://schemas.microsoft.com/office/drawing/2014/main" id="{5958EAC4-08F2-4945-9F0D-E088897A9830}"/>
+              </a:ext>
+            </a:extLst>
+          </p:cNvPr>
+          <p:cNvSpPr/>
+          <p:nvPr/>
+        </p:nvSpPr>
+        <p:spPr>
+          <a:xfrm>
+            <a:off x="1505577" y="5257799"/>
+            <a:ext cx="1696614" cy="369332"/>
+          </a:xfrm>
+          <a:prstGeom prst="rect">
+            <a:avLst/>
+          </a:prstGeom>
+        </p:spPr>
+        <p:txBody>
+          <a:bodyPr wrap="square">
+            <a:spAutoFit/>
+          </a:bodyPr>
+          <a:lstStyle/>
+          <a:p>
+            <a:r>
+              <a:rPr lang="en-US" i="1" dirty="0"/>
+              <a:t>Residual Plots</a:t>
+            </a:r>
+          </a:p>
+        </p:txBody>
+      </p:sp>
+      <p:pic>
+        <p:nvPicPr>
+          <p:cNvPr id="3" name="Picture 2">
+            <a:extLst>
+              <a:ext uri="{FF2B5EF4-FFF2-40B4-BE49-F238E27FC236}">
+                <a16:creationId xmlns:a16="http://schemas.microsoft.com/office/drawing/2014/main" id="{CFB1D0D0-9834-5145-886D-EF7B3034B010}"/>
+              </a:ext>
+            </a:extLst>
+          </p:cNvPr>
+          <p:cNvPicPr>
+            <a:picLocks noChangeAspect="1"/>
+          </p:cNvPicPr>
+          <p:nvPr/>
+        </p:nvPicPr>
+        <p:blipFill>
+          <a:blip r:embed="rId3"/>
+          <a:stretch>
+            <a:fillRect/>
+          </a:stretch>
+        </p:blipFill>
+        <p:spPr>
+          <a:xfrm>
+            <a:off x="228365" y="2459184"/>
+            <a:ext cx="4251039" cy="2633677"/>
+          </a:xfrm>
+          <a:prstGeom prst="rect">
+            <a:avLst/>
+          </a:prstGeom>
+        </p:spPr>
+      </p:pic>
+      <p:sp>
+        <p:nvSpPr>
+          <p:cNvPr id="6" name="Content Placeholder 5">
+            <a:extLst>
+              <a:ext uri="{FF2B5EF4-FFF2-40B4-BE49-F238E27FC236}">
+                <a16:creationId xmlns:a16="http://schemas.microsoft.com/office/drawing/2014/main" id="{609EE888-CDA0-C44C-9596-E1505292E2BB}"/>
+              </a:ext>
+            </a:extLst>
+          </p:cNvPr>
+          <p:cNvSpPr>
+            <a:spLocks noGrp="1"/>
+          </p:cNvSpPr>
+          <p:nvPr>
+            <p:ph idx="1"/>
+          </p:nvPr>
+        </p:nvSpPr>
+        <p:spPr>
+          <a:xfrm>
+            <a:off x="457200" y="1600201"/>
+            <a:ext cx="5237018" cy="630382"/>
+          </a:xfrm>
+        </p:spPr>
+        <p:txBody>
+          <a:bodyPr/>
+          <a:lstStyle/>
+          <a:p>
+            <a:r>
+              <a:rPr lang="en-US" dirty="0"/>
+              <a:t>Assumption Checking</a:t>
+            </a:r>
+          </a:p>
+        </p:txBody>
+      </p:sp>
+      <p:pic>
+        <p:nvPicPr>
+          <p:cNvPr id="8" name="Picture 7">
+            <a:extLst>
+              <a:ext uri="{FF2B5EF4-FFF2-40B4-BE49-F238E27FC236}">
+                <a16:creationId xmlns:a16="http://schemas.microsoft.com/office/drawing/2014/main" id="{72329511-034D-9E4D-8F48-131D753893B8}"/>
+              </a:ext>
+            </a:extLst>
+          </p:cNvPr>
+          <p:cNvPicPr>
+            <a:picLocks noChangeAspect="1"/>
+          </p:cNvPicPr>
+          <p:nvPr/>
+        </p:nvPicPr>
+        <p:blipFill>
+          <a:blip r:embed="rId4"/>
+          <a:stretch>
+            <a:fillRect/>
+          </a:stretch>
+        </p:blipFill>
+        <p:spPr>
+          <a:xfrm>
+            <a:off x="4664599" y="2459185"/>
+            <a:ext cx="3970116" cy="2639532"/>
+          </a:xfrm>
+          <a:prstGeom prst="rect">
+            <a:avLst/>
+          </a:prstGeom>
+        </p:spPr>
+      </p:pic>
+      <p:sp>
+        <p:nvSpPr>
+          <p:cNvPr id="9" name="Rectangle 8">
+            <a:extLst>
+              <a:ext uri="{FF2B5EF4-FFF2-40B4-BE49-F238E27FC236}">
+                <a16:creationId xmlns:a16="http://schemas.microsoft.com/office/drawing/2014/main" id="{F30B2734-644D-F042-8B09-5FDFD816578E}"/>
+              </a:ext>
+            </a:extLst>
+          </p:cNvPr>
+          <p:cNvSpPr/>
+          <p:nvPr/>
+        </p:nvSpPr>
+        <p:spPr>
+          <a:xfrm>
+            <a:off x="4705110" y="5257799"/>
+            <a:ext cx="3889093" cy="369332"/>
+          </a:xfrm>
+          <a:prstGeom prst="rect">
+            <a:avLst/>
+          </a:prstGeom>
+        </p:spPr>
+        <p:txBody>
+          <a:bodyPr wrap="square">
+            <a:spAutoFit/>
+          </a:bodyPr>
+          <a:lstStyle/>
+          <a:p>
+            <a:r>
+              <a:rPr lang="en-US" i="1" dirty="0"/>
+              <a:t>Outliers and Leverage Points</a:t>
+            </a:r>
+          </a:p>
+        </p:txBody>
+      </p:sp>
+    </p:spTree>
+    <p:extLst>
+      <p:ext uri="{BB962C8B-B14F-4D97-AF65-F5344CB8AC3E}">
+        <p14:creationId xmlns:p14="http://schemas.microsoft.com/office/powerpoint/2010/main" val="1040865318"/>
+      </p:ext>
+    </p:extLst>
+  </p:cSld>
+  <p:clrMapOvr>
+    <a:masterClrMapping/>
+  </p:clrMapOvr>
+</p:sld>
+</file>
+
+<file path=ppt/slides/slide14.xml><?xml version="1.0" encoding="utf-8"?>
+<p:sld xmlns:a="http://schemas.openxmlformats.org/drawingml/2006/main" xmlns:r="http://schemas.openxmlformats.org/officeDocument/2006/relationships" xmlns:p="http://schemas.openxmlformats.org/presentationml/2006/main">
+  <p:cSld>
+    <p:spTree>
+      <p:nvGrpSpPr>
+        <p:cNvPr id="1" name=""/>
+        <p:cNvGrpSpPr/>
+        <p:nvPr/>
+      </p:nvGrpSpPr>
+      <p:grpSpPr>
+        <a:xfrm>
+          <a:off x="0" y="0"/>
+          <a:ext cx="0" cy="0"/>
+          <a:chOff x="0" y="0"/>
+          <a:chExt cx="0" cy="0"/>
+        </a:xfrm>
+      </p:grpSpPr>
+      <p:sp>
+        <p:nvSpPr>
+          <p:cNvPr id="2" name="Title 1">
+            <a:extLst>
+              <a:ext uri="{FF2B5EF4-FFF2-40B4-BE49-F238E27FC236}">
+                <a16:creationId xmlns:a16="http://schemas.microsoft.com/office/drawing/2014/main" id="{5B931770-76C9-F749-9B7D-08A4A1F13896}"/>
+              </a:ext>
+            </a:extLst>
+          </p:cNvPr>
+          <p:cNvSpPr>
+            <a:spLocks noGrp="1"/>
+          </p:cNvSpPr>
+          <p:nvPr>
+            <p:ph type="title"/>
+          </p:nvPr>
+        </p:nvSpPr>
+        <p:spPr>
+          <a:xfrm>
+            <a:off x="0" y="228600"/>
+            <a:ext cx="9144000" cy="1143000"/>
+          </a:xfrm>
+        </p:spPr>
+        <p:txBody>
+          <a:bodyPr/>
+          <a:lstStyle/>
+          <a:p>
+            <a:r>
+              <a:rPr lang="en-US" dirty="0"/>
+              <a:t>Multiple Linear Regression</a:t>
+            </a:r>
+          </a:p>
+        </p:txBody>
+      </p:sp>
+      <p:sp>
+        <p:nvSpPr>
+          <p:cNvPr id="5" name="Content Placeholder 4">
+            <a:extLst>
+              <a:ext uri="{FF2B5EF4-FFF2-40B4-BE49-F238E27FC236}">
+                <a16:creationId xmlns:a16="http://schemas.microsoft.com/office/drawing/2014/main" id="{375CDB98-7F05-41AD-9F29-81E3D0CFBEFF}"/>
+              </a:ext>
+            </a:extLst>
+          </p:cNvPr>
+          <p:cNvSpPr>
+            <a:spLocks noGrp="1"/>
+          </p:cNvSpPr>
+          <p:nvPr>
+            <p:ph idx="1"/>
+          </p:nvPr>
+        </p:nvSpPr>
+        <p:spPr>
+          <a:xfrm>
+            <a:off x="335666" y="2160341"/>
+            <a:ext cx="8351133" cy="4321575"/>
+          </a:xfrm>
+        </p:spPr>
+        <p:txBody>
+          <a:bodyPr/>
+          <a:lstStyle/>
+          <a:p>
+            <a:pPr marL="0" indent="0">
+              <a:buNone/>
+            </a:pPr>
+            <a:r>
+              <a:rPr lang="en-US" dirty="0"/>
+              <a:t>Reduced Model</a:t>
+            </a:r>
+          </a:p>
+          <a:p>
+            <a:pPr>
+              <a:buFont typeface="Wingdings" pitchFamily="2" charset="2"/>
+              <a:buChar char="q"/>
+            </a:pPr>
+            <a:r>
+              <a:rPr lang="en-US" sz="2000" dirty="0"/>
+              <a:t>Business Travel</a:t>
+            </a:r>
+          </a:p>
+          <a:p>
+            <a:pPr>
+              <a:buFont typeface="Wingdings" pitchFamily="2" charset="2"/>
+              <a:buChar char="q"/>
+            </a:pPr>
+            <a:r>
+              <a:rPr lang="en-US" sz="2000" dirty="0"/>
+              <a:t>Daily Rate</a:t>
+            </a:r>
+          </a:p>
+          <a:p>
+            <a:pPr>
+              <a:buFont typeface="Wingdings" pitchFamily="2" charset="2"/>
+              <a:buChar char="q"/>
+            </a:pPr>
+            <a:r>
+              <a:rPr lang="en-US" sz="2000" dirty="0"/>
+              <a:t>Job Level</a:t>
+            </a:r>
+          </a:p>
+          <a:p>
+            <a:pPr>
+              <a:buFont typeface="Wingdings" pitchFamily="2" charset="2"/>
+              <a:buChar char="q"/>
+            </a:pPr>
+            <a:r>
+              <a:rPr lang="en-US" sz="2000" dirty="0"/>
+              <a:t>Job Role</a:t>
+            </a:r>
+          </a:p>
+          <a:p>
+            <a:pPr>
+              <a:buFont typeface="Wingdings" pitchFamily="2" charset="2"/>
+              <a:buChar char="q"/>
+            </a:pPr>
+            <a:r>
+              <a:rPr lang="en-US" sz="2000" dirty="0"/>
+              <a:t>Total Working Years</a:t>
+            </a:r>
+          </a:p>
+          <a:p>
+            <a:pPr marL="0" indent="0">
+              <a:buNone/>
+            </a:pPr>
+            <a:endParaRPr lang="en-US" dirty="0"/>
+          </a:p>
+          <a:p>
+            <a:pPr marL="0" indent="0">
+              <a:buNone/>
+            </a:pPr>
+            <a:endParaRPr lang="en-US" dirty="0"/>
+          </a:p>
+          <a:p>
+            <a:endParaRPr lang="en-US" dirty="0"/>
+          </a:p>
+          <a:p>
+            <a:endParaRPr lang="en-US" dirty="0"/>
+          </a:p>
+          <a:p>
+            <a:endParaRPr lang="en-US" dirty="0"/>
+          </a:p>
+          <a:p>
+            <a:endParaRPr lang="en-US" dirty="0"/>
+          </a:p>
+          <a:p>
+            <a:endParaRPr lang="en-US" dirty="0"/>
+          </a:p>
+          <a:p>
+            <a:pPr marL="0" indent="0">
+              <a:buNone/>
+            </a:pPr>
+            <a:endParaRPr lang="en-US" sz="1600" i="1" dirty="0"/>
+          </a:p>
+          <a:p>
+            <a:pPr marL="0" indent="0">
+              <a:buNone/>
+            </a:pPr>
+            <a:endParaRPr lang="en-US" dirty="0"/>
+          </a:p>
+          <a:p>
+            <a:pPr marL="0" indent="0">
+              <a:buNone/>
+            </a:pPr>
+            <a:endParaRPr lang="en-US" dirty="0"/>
+          </a:p>
+        </p:txBody>
+      </p:sp>
+      <p:pic>
+        <p:nvPicPr>
+          <p:cNvPr id="4" name="Picture 3">
+            <a:extLst>
+              <a:ext uri="{FF2B5EF4-FFF2-40B4-BE49-F238E27FC236}">
+                <a16:creationId xmlns:a16="http://schemas.microsoft.com/office/drawing/2014/main" id="{5DA5C174-3987-A54B-AFE3-8E882D1DF1F5}"/>
+              </a:ext>
+            </a:extLst>
+          </p:cNvPr>
+          <p:cNvPicPr>
+            <a:picLocks noChangeAspect="1"/>
+          </p:cNvPicPr>
+          <p:nvPr/>
+        </p:nvPicPr>
+        <p:blipFill>
+          <a:blip r:embed="rId2"/>
+          <a:stretch>
+            <a:fillRect/>
+          </a:stretch>
+        </p:blipFill>
+        <p:spPr>
+          <a:xfrm>
+            <a:off x="3871730" y="2160341"/>
+            <a:ext cx="4710886" cy="3622969"/>
+          </a:xfrm>
+          <a:prstGeom prst="rect">
+            <a:avLst/>
+          </a:prstGeom>
+        </p:spPr>
+      </p:pic>
+    </p:spTree>
+    <p:extLst>
+      <p:ext uri="{BB962C8B-B14F-4D97-AF65-F5344CB8AC3E}">
+        <p14:creationId xmlns:p14="http://schemas.microsoft.com/office/powerpoint/2010/main" val="724258878"/>
+      </p:ext>
+    </p:extLst>
+  </p:cSld>
+  <p:clrMapOvr>
+    <a:masterClrMapping/>
+  </p:clrMapOvr>
+</p:sld>
+</file>
+
+<file path=ppt/slides/slide15.xml><?xml version="1.0" encoding="utf-8"?>
+<p:sld xmlns:a="http://schemas.openxmlformats.org/drawingml/2006/main" xmlns:r="http://schemas.openxmlformats.org/officeDocument/2006/relationships" xmlns:p="http://schemas.openxmlformats.org/presentationml/2006/main">
+  <p:cSld>
+    <p:spTree>
+      <p:nvGrpSpPr>
+        <p:cNvPr id="1" name=""/>
+        <p:cNvGrpSpPr/>
+        <p:nvPr/>
+      </p:nvGrpSpPr>
+      <p:grpSpPr>
+        <a:xfrm>
+          <a:off x="0" y="0"/>
+          <a:ext cx="0" cy="0"/>
+          <a:chOff x="0" y="0"/>
+          <a:chExt cx="0" cy="0"/>
+        </a:xfrm>
+      </p:grpSpPr>
+      <p:sp>
+        <p:nvSpPr>
+          <p:cNvPr id="2" name="Title 1">
+            <a:extLst>
+              <a:ext uri="{FF2B5EF4-FFF2-40B4-BE49-F238E27FC236}">
+                <a16:creationId xmlns:a16="http://schemas.microsoft.com/office/drawing/2014/main" id="{5B931770-76C9-F749-9B7D-08A4A1F13896}"/>
+              </a:ext>
+            </a:extLst>
+          </p:cNvPr>
+          <p:cNvSpPr>
+            <a:spLocks noGrp="1"/>
+          </p:cNvSpPr>
+          <p:nvPr>
+            <p:ph type="title"/>
+          </p:nvPr>
+        </p:nvSpPr>
+        <p:spPr>
+          <a:xfrm>
+            <a:off x="0" y="228600"/>
+            <a:ext cx="9144000" cy="1143000"/>
+          </a:xfrm>
+        </p:spPr>
+        <p:txBody>
+          <a:bodyPr/>
+          <a:lstStyle/>
+          <a:p>
+            <a:r>
+              <a:rPr lang="en-US" dirty="0"/>
               <a:t>Cross Validation</a:t>
             </a:r>
           </a:p>
@@ -3929,7 +4434,7 @@
 </p:sld>
 </file>
 
-<file path=ppt/slides/slide14.xml><?xml version="1.0" encoding="utf-8"?>
+<file path=ppt/slides/slide16.xml><?xml version="1.0" encoding="utf-8"?>
 <p:sld xmlns:a="http://schemas.openxmlformats.org/drawingml/2006/main" xmlns:r="http://schemas.openxmlformats.org/officeDocument/2006/relationships" xmlns:p="http://schemas.openxmlformats.org/presentationml/2006/main">
   <p:cSld>
     <p:spTree>
@@ -4150,7 +4655,7 @@
             </a:r>
             <a:r>
               <a:rPr lang="en-US" sz="2800" dirty="0"/>
-              <a:t> was not substantially different between the classification models that were reviewed</a:t>
+              <a:t> surprisingly was not substantially different between the classification models that were reviewed</a:t>
             </a:r>
           </a:p>
           <a:p>
@@ -4178,22 +4683,44 @@
           <a:p>
             <a:r>
               <a:rPr lang="en-US" sz="2800" b="1" dirty="0"/>
-              <a:t>Cross Validation</a:t>
+              <a:t>Cross Validation </a:t>
             </a:r>
             <a:r>
               <a:rPr lang="en-US" sz="2800" dirty="0"/>
-              <a:t> can hopefully net us similar results to our trained model against </a:t>
+              <a:t>was also instrumental in our ability to control for overfitting as we generally saw </a:t>
             </a:r>
             <a:r>
               <a:rPr lang="en-US" sz="2800" b="1" dirty="0"/>
-              <a:t>unseen data.  </a:t>
-            </a:r>
-          </a:p>
-          <a:p>
-            <a:pPr marL="0" indent="0">
-              <a:buNone/>
-            </a:pPr>
-            <a:endParaRPr lang="en-US" sz="2800" b="1" dirty="0"/>
+              <a:t>unrealistic performance</a:t>
+            </a:r>
+            <a:r>
+              <a:rPr lang="en-US" sz="2800" dirty="0"/>
+              <a:t> outcomes with using only the </a:t>
+            </a:r>
+            <a:r>
+              <a:rPr lang="en-US" sz="2800" b="1" dirty="0"/>
+              <a:t>training data </a:t>
+            </a:r>
+            <a:r>
+              <a:rPr lang="en-US" sz="2800" dirty="0"/>
+              <a:t>set</a:t>
+            </a:r>
+            <a:r>
+              <a:rPr lang="en-US" sz="2800" b="1" dirty="0"/>
+              <a:t> </a:t>
+            </a:r>
+            <a:r>
+              <a:rPr lang="en-US" sz="2800" dirty="0"/>
+              <a:t>to </a:t>
+            </a:r>
+            <a:r>
+              <a:rPr lang="en-US" sz="2800" b="1" dirty="0"/>
+              <a:t>validate</a:t>
+            </a:r>
+            <a:r>
+              <a:rPr lang="en-US" sz="2800" dirty="0"/>
+              <a:t> against.</a:t>
+            </a:r>
           </a:p>
           <a:p>
             <a:pPr marL="0" indent="0">
@@ -4227,7 +4754,7 @@
 </p:sld>
 </file>
 
-<file path=ppt/slides/slide15.xml><?xml version="1.0" encoding="utf-8"?>
+<file path=ppt/slides/slide17.xml><?xml version="1.0" encoding="utf-8"?>
 <p:sld xmlns:a="http://schemas.openxmlformats.org/drawingml/2006/main" xmlns:r="http://schemas.openxmlformats.org/officeDocument/2006/relationships" xmlns:p="http://schemas.openxmlformats.org/presentationml/2006/main">
   <p:cSld>
     <p:spTree>
@@ -4297,7 +4824,7 @@
           <a:p>
             <a:r>
               <a:rPr lang="en-US" dirty="0"/>
-              <a:t>Questions of Interest</a:t>
+              <a:t>Agenda</a:t>
             </a:r>
           </a:p>
         </p:txBody>
@@ -4317,7 +4844,7 @@
           <p:nvPr>
             <p:extLst>
               <p:ext uri="{D42A27DB-BD31-4B8C-83A1-F6EECF244321}">
-                <p14:modId xmlns:p14="http://schemas.microsoft.com/office/powerpoint/2010/main" val="1297382134"/>
+                <p14:modId xmlns:p14="http://schemas.microsoft.com/office/powerpoint/2010/main" val="2214001317"/>
               </p:ext>
             </p:extLst>
           </p:nvPr>
@@ -4586,7 +5113,7 @@
                           <a:latin typeface="Calibri" panose="020F0502020204030204" pitchFamily="34" charset="0"/>
                           <a:cs typeface="Calibri" panose="020F0502020204030204" pitchFamily="34" charset="0"/>
                         </a:rPr>
-                        <a:t>7 minutes</a:t>
+                        <a:t>5-7 minutes</a:t>
                       </a:r>
                       <a:endParaRPr lang="en-US" sz="2400" dirty="0">
                         <a:latin typeface="Calibri" panose="020F0502020204030204" pitchFamily="34" charset="0"/>
@@ -5368,7 +5895,7 @@
           <a:p>
             <a:r>
               <a:rPr lang="en-US" dirty="0"/>
-              <a:t>Monthly Income seems to be relatively correlated with the employee’s total working years</a:t>
+              <a:t>As we saw on the previous slide, “years” based data points are correlated with other time-based measures, in addition to Monthly Income.</a:t>
             </a:r>
           </a:p>
           <a:p>
@@ -5415,7 +5942,7 @@
         </p:blipFill>
         <p:spPr>
           <a:xfrm>
-            <a:off x="966785" y="3429000"/>
+            <a:off x="966785" y="3777585"/>
             <a:ext cx="7210430" cy="2740306"/>
           </a:xfrm>
           <a:prstGeom prst="rect">
@@ -5458,7 +5985,7 @@
           <p:cNvPr id="2" name="Title 1">
             <a:extLst>
               <a:ext uri="{FF2B5EF4-FFF2-40B4-BE49-F238E27FC236}">
-                <a16:creationId xmlns:a16="http://schemas.microsoft.com/office/drawing/2014/main" id="{5B931770-76C9-F749-9B7D-08A4A1F13896}"/>
+                <a16:creationId xmlns:a16="http://schemas.microsoft.com/office/drawing/2014/main" id="{22E7B044-774A-4F21-9924-F12F18F5AFF4}"/>
               </a:ext>
             </a:extLst>
           </p:cNvPr>
@@ -5469,29 +5996,24 @@
             <p:ph type="title"/>
           </p:nvPr>
         </p:nvSpPr>
-        <p:spPr>
-          <a:xfrm>
-            <a:off x="0" y="228600"/>
-            <a:ext cx="9144000" cy="1143000"/>
-          </a:xfrm>
-        </p:spPr>
+        <p:spPr/>
         <p:txBody>
           <a:bodyPr/>
           <a:lstStyle/>
           <a:p>
             <a:r>
               <a:rPr lang="en-US" dirty="0"/>
-              <a:t>Attrition Prediction (KNN)</a:t>
+              <a:t>Attrition Prediction Models</a:t>
             </a:r>
           </a:p>
         </p:txBody>
       </p:sp>
       <p:sp>
         <p:nvSpPr>
-          <p:cNvPr id="5" name="Content Placeholder 4">
+          <p:cNvPr id="3" name="Content Placeholder 2">
             <a:extLst>
               <a:ext uri="{FF2B5EF4-FFF2-40B4-BE49-F238E27FC236}">
-                <a16:creationId xmlns:a16="http://schemas.microsoft.com/office/drawing/2014/main" id="{375CDB98-7F05-41AD-9F29-81E3D0CFBEFF}"/>
+                <a16:creationId xmlns:a16="http://schemas.microsoft.com/office/drawing/2014/main" id="{BAB8A5B3-BF76-4015-AE68-D812260929BA}"/>
               </a:ext>
             </a:extLst>
           </p:cNvPr>
@@ -5504,145 +6026,119 @@
         </p:nvSpPr>
         <p:spPr>
           <a:xfrm>
-            <a:off x="457199" y="1627905"/>
-            <a:ext cx="8229600" cy="4854011"/>
+            <a:off x="457200" y="1600200"/>
+            <a:ext cx="8229600" cy="4525963"/>
           </a:xfrm>
         </p:spPr>
         <p:txBody>
           <a:bodyPr/>
           <a:lstStyle/>
           <a:p>
-            <a:endParaRPr lang="en-US" dirty="0"/>
-          </a:p>
-          <a:p>
-            <a:endParaRPr lang="en-US" dirty="0"/>
-          </a:p>
-          <a:p>
-            <a:endParaRPr lang="en-US" dirty="0"/>
-          </a:p>
-          <a:p>
-            <a:endParaRPr lang="en-US" dirty="0"/>
-          </a:p>
-          <a:p>
-            <a:endParaRPr lang="en-US" dirty="0"/>
+            <a:pPr>
+              <a:buFont typeface="Wingdings" panose="05000000000000000000" pitchFamily="2" charset="2"/>
+              <a:buChar char="q"/>
+            </a:pPr>
+            <a:r>
+              <a:rPr lang="en-US" sz="2800" dirty="0"/>
+              <a:t>KNN</a:t>
+            </a:r>
+          </a:p>
+          <a:p>
+            <a:pPr lvl="1">
+              <a:buFont typeface="Wingdings" panose="05000000000000000000" pitchFamily="2" charset="2"/>
+              <a:buChar char="Ø"/>
+            </a:pPr>
+            <a:r>
+              <a:rPr lang="en-US" sz="2000" dirty="0"/>
+              <a:t>K-Nearest Neighbors Clustering Classifier</a:t>
+            </a:r>
+          </a:p>
+          <a:p>
+            <a:pPr>
+              <a:buFont typeface="Wingdings" panose="05000000000000000000" pitchFamily="2" charset="2"/>
+              <a:buChar char="q"/>
+            </a:pPr>
+            <a:r>
+              <a:rPr lang="en-US" sz="2800" dirty="0"/>
+              <a:t>Naïve Bayes</a:t>
+            </a:r>
+          </a:p>
+          <a:p>
+            <a:pPr lvl="1">
+              <a:buFont typeface="Wingdings" panose="05000000000000000000" pitchFamily="2" charset="2"/>
+              <a:buChar char="Ø"/>
+            </a:pPr>
+            <a:r>
+              <a:rPr lang="en-US" sz="2000" dirty="0"/>
+              <a:t>Probabilistic Classifier</a:t>
+            </a:r>
+          </a:p>
+          <a:p>
+            <a:pPr>
+              <a:buFont typeface="Wingdings" panose="05000000000000000000" pitchFamily="2" charset="2"/>
+              <a:buChar char="q"/>
+            </a:pPr>
+            <a:r>
+              <a:rPr lang="en-US" sz="2800" dirty="0"/>
+              <a:t>Logistic Regression</a:t>
+            </a:r>
+          </a:p>
+          <a:p>
+            <a:pPr lvl="1">
+              <a:buFont typeface="Wingdings" panose="05000000000000000000" pitchFamily="2" charset="2"/>
+              <a:buChar char="Ø"/>
+            </a:pPr>
+            <a:r>
+              <a:rPr lang="en-US" sz="2000" dirty="0"/>
+              <a:t>Supervised learning classifier with decision boundaries</a:t>
+            </a:r>
+          </a:p>
+          <a:p>
+            <a:pPr>
+              <a:buFont typeface="Wingdings" panose="05000000000000000000" pitchFamily="2" charset="2"/>
+              <a:buChar char="q"/>
+            </a:pPr>
+            <a:r>
+              <a:rPr lang="en-US" sz="2800" dirty="0"/>
+              <a:t>Random Forest</a:t>
+            </a:r>
+          </a:p>
+          <a:p>
+            <a:pPr lvl="1">
+              <a:buFont typeface="Wingdings" panose="05000000000000000000" pitchFamily="2" charset="2"/>
+              <a:buChar char="Ø"/>
+            </a:pPr>
+            <a:r>
+              <a:rPr lang="en-US" sz="2000" dirty="0"/>
+              <a:t>Multiple Decision Trees Averaged Out</a:t>
+            </a:r>
+          </a:p>
+          <a:p>
+            <a:pPr>
+              <a:buFont typeface="Wingdings" panose="05000000000000000000" pitchFamily="2" charset="2"/>
+              <a:buChar char="q"/>
+            </a:pPr>
+            <a:r>
+              <a:rPr lang="en-US" sz="2800" dirty="0"/>
+              <a:t>Support Vector Machines</a:t>
+            </a:r>
+          </a:p>
+          <a:p>
+            <a:pPr lvl="1">
+              <a:buFont typeface="Wingdings" panose="05000000000000000000" pitchFamily="2" charset="2"/>
+              <a:buChar char="Ø"/>
+            </a:pPr>
+            <a:r>
+              <a:rPr lang="en-US" sz="2000" dirty="0"/>
+              <a:t>Similar to Logistic Regression but with wider buffers (vectors) between classes</a:t>
+            </a:r>
           </a:p>
         </p:txBody>
       </p:sp>
-      <p:sp>
-        <p:nvSpPr>
-          <p:cNvPr id="4" name="Rectangle 3">
-            <a:extLst>
-              <a:ext uri="{FF2B5EF4-FFF2-40B4-BE49-F238E27FC236}">
-                <a16:creationId xmlns:a16="http://schemas.microsoft.com/office/drawing/2014/main" id="{6608DBBE-C619-4CEB-9667-544ECD27A105}"/>
-              </a:ext>
-            </a:extLst>
-          </p:cNvPr>
-          <p:cNvSpPr/>
-          <p:nvPr/>
-        </p:nvSpPr>
-        <p:spPr>
-          <a:xfrm>
-            <a:off x="190366" y="5835585"/>
-            <a:ext cx="8763265" cy="646331"/>
-          </a:xfrm>
-          <a:prstGeom prst="rect">
-            <a:avLst/>
-          </a:prstGeom>
-        </p:spPr>
-        <p:txBody>
-          <a:bodyPr wrap="square">
-            <a:spAutoFit/>
-          </a:bodyPr>
-          <a:lstStyle/>
-          <a:p>
-            <a:r>
-              <a:rPr lang="en-US" i="1" dirty="0"/>
-              <a:t>Using a </a:t>
-            </a:r>
-            <a:r>
-              <a:rPr lang="en-US" dirty="0"/>
-              <a:t>10-fold Cross-Validated resampling with k = 15, the model was able to achieve an an AUC (Area under the Curve) of </a:t>
-            </a:r>
-            <a:r>
-              <a:rPr lang="en-US" dirty="0">
-                <a:highlight>
-                  <a:srgbClr val="FFFF00"/>
-                </a:highlight>
-              </a:rPr>
-              <a:t>0.7223</a:t>
-            </a:r>
-            <a:r>
-              <a:rPr lang="en-US" dirty="0"/>
-              <a:t> against our test data set.</a:t>
-            </a:r>
-            <a:endParaRPr lang="en-US" i="1" dirty="0"/>
-          </a:p>
-        </p:txBody>
-      </p:sp>
-      <p:pic>
-        <p:nvPicPr>
-          <p:cNvPr id="3" name="Picture 2">
-            <a:extLst>
-              <a:ext uri="{FF2B5EF4-FFF2-40B4-BE49-F238E27FC236}">
-                <a16:creationId xmlns:a16="http://schemas.microsoft.com/office/drawing/2014/main" id="{D06D3787-EB0E-1E46-B287-2E37C14D8929}"/>
-              </a:ext>
-            </a:extLst>
-          </p:cNvPr>
-          <p:cNvPicPr>
-            <a:picLocks noChangeAspect="1"/>
-          </p:cNvPicPr>
-          <p:nvPr/>
-        </p:nvPicPr>
-        <p:blipFill>
-          <a:blip r:embed="rId2"/>
-          <a:stretch>
-            <a:fillRect/>
-          </a:stretch>
-        </p:blipFill>
-        <p:spPr>
-          <a:xfrm>
-            <a:off x="5739399" y="1588929"/>
-            <a:ext cx="2959100" cy="3810000"/>
-          </a:xfrm>
-          <a:prstGeom prst="rect">
-            <a:avLst/>
-          </a:prstGeom>
-        </p:spPr>
-      </p:pic>
-      <p:pic>
-        <p:nvPicPr>
-          <p:cNvPr id="6" name="Picture 5">
-            <a:extLst>
-              <a:ext uri="{FF2B5EF4-FFF2-40B4-BE49-F238E27FC236}">
-                <a16:creationId xmlns:a16="http://schemas.microsoft.com/office/drawing/2014/main" id="{2BDCE404-DCAE-3E49-81AF-1F6D81838BC3}"/>
-              </a:ext>
-            </a:extLst>
-          </p:cNvPr>
-          <p:cNvPicPr>
-            <a:picLocks noChangeAspect="1"/>
-          </p:cNvPicPr>
-          <p:nvPr/>
-        </p:nvPicPr>
-        <p:blipFill>
-          <a:blip r:embed="rId3"/>
-          <a:stretch>
-            <a:fillRect/>
-          </a:stretch>
-        </p:blipFill>
-        <p:spPr>
-          <a:xfrm>
-            <a:off x="445499" y="1588929"/>
-            <a:ext cx="4699000" cy="3162300"/>
-          </a:xfrm>
-          <a:prstGeom prst="rect">
-            <a:avLst/>
-          </a:prstGeom>
-        </p:spPr>
-      </p:pic>
     </p:spTree>
     <p:extLst>
       <p:ext uri="{BB962C8B-B14F-4D97-AF65-F5344CB8AC3E}">
-        <p14:creationId xmlns:p14="http://schemas.microsoft.com/office/powerpoint/2010/main" val="3119558950"/>
+        <p14:creationId xmlns:p14="http://schemas.microsoft.com/office/powerpoint/2010/main" val="145167019"/>
       </p:ext>
     </p:extLst>
   </p:cSld>
@@ -5697,7 +6193,7 @@
           <a:p>
             <a:r>
               <a:rPr lang="en-US" dirty="0"/>
-              <a:t>Naive Bayes</a:t>
+              <a:t>KNN</a:t>
             </a:r>
           </a:p>
         </p:txBody>
@@ -5759,7 +6255,7 @@
         <p:spPr>
           <a:xfrm>
             <a:off x="190366" y="5835585"/>
-            <a:ext cx="8763265" cy="369332"/>
+            <a:ext cx="8763265" cy="646331"/>
           </a:xfrm>
           <a:prstGeom prst="rect">
             <a:avLst/>
@@ -5773,7 +6269,11 @@
           <a:p>
             <a:r>
               <a:rPr lang="en-US" i="1" dirty="0"/>
-              <a:t>With a 70/30 train-test split with were able to achieve an AUC of </a:t>
+              <a:t>Using a </a:t>
+            </a:r>
+            <a:r>
+              <a:rPr lang="en-US" dirty="0"/>
+              <a:t>10-fold Cross-Validated resampling with k = 15, the model was able to achieve an an AUC (Area under the Curve) of </a:t>
             </a:r>
             <a:r>
               <a:rPr lang="en-US" dirty="0">
@@ -5781,7 +6281,11 @@
                   <a:srgbClr val="FFFF00"/>
                 </a:highlight>
               </a:rPr>
-              <a:t>0.7148.</a:t>
+              <a:t>0.7223</a:t>
+            </a:r>
+            <a:r>
+              <a:rPr lang="en-US" dirty="0"/>
+              <a:t> against our test data set.</a:t>
             </a:r>
             <a:endParaRPr lang="en-US" i="1" dirty="0"/>
           </a:p>
@@ -5789,10 +6293,10 @@
       </p:sp>
       <p:pic>
         <p:nvPicPr>
-          <p:cNvPr id="7" name="Picture 6">
+          <p:cNvPr id="3" name="Picture 2">
             <a:extLst>
               <a:ext uri="{FF2B5EF4-FFF2-40B4-BE49-F238E27FC236}">
-                <a16:creationId xmlns:a16="http://schemas.microsoft.com/office/drawing/2014/main" id="{1348F902-6A30-2F42-B539-35D0BB7331EC}"/>
+                <a16:creationId xmlns:a16="http://schemas.microsoft.com/office/drawing/2014/main" id="{D06D3787-EB0E-1E46-B287-2E37C14D8929}"/>
               </a:ext>
             </a:extLst>
           </p:cNvPr>
@@ -5809,8 +6313,8 @@
         </p:blipFill>
         <p:spPr>
           <a:xfrm>
-            <a:off x="5981699" y="1473200"/>
-            <a:ext cx="2705100" cy="3911600"/>
+            <a:off x="5739399" y="1588929"/>
+            <a:ext cx="2959100" cy="3810000"/>
           </a:xfrm>
           <a:prstGeom prst="rect">
             <a:avLst/>
@@ -5819,10 +6323,10 @@
       </p:pic>
       <p:pic>
         <p:nvPicPr>
-          <p:cNvPr id="8" name="Picture 7">
+          <p:cNvPr id="6" name="Picture 5">
             <a:extLst>
               <a:ext uri="{FF2B5EF4-FFF2-40B4-BE49-F238E27FC236}">
-                <a16:creationId xmlns:a16="http://schemas.microsoft.com/office/drawing/2014/main" id="{9D8CE489-8716-DB48-AF85-6782456806EB}"/>
+                <a16:creationId xmlns:a16="http://schemas.microsoft.com/office/drawing/2014/main" id="{2BDCE404-DCAE-3E49-81AF-1F6D81838BC3}"/>
               </a:ext>
             </a:extLst>
           </p:cNvPr>
@@ -5839,8 +6343,8 @@
         </p:blipFill>
         <p:spPr>
           <a:xfrm>
-            <a:off x="587496" y="1473200"/>
-            <a:ext cx="4635500" cy="3162300"/>
+            <a:off x="445499" y="1588929"/>
+            <a:ext cx="4699000" cy="3162300"/>
           </a:xfrm>
           <a:prstGeom prst="rect">
             <a:avLst/>
@@ -5850,7 +6354,7 @@
     </p:spTree>
     <p:extLst>
       <p:ext uri="{BB962C8B-B14F-4D97-AF65-F5344CB8AC3E}">
-        <p14:creationId xmlns:p14="http://schemas.microsoft.com/office/powerpoint/2010/main" val="1075104819"/>
+        <p14:creationId xmlns:p14="http://schemas.microsoft.com/office/powerpoint/2010/main" val="3119558950"/>
       </p:ext>
     </p:extLst>
   </p:cSld>
@@ -5905,7 +6409,7 @@
           <a:p>
             <a:r>
               <a:rPr lang="en-US" dirty="0"/>
-              <a:t>Random Forest</a:t>
+              <a:t>Naive Bayes</a:t>
             </a:r>
           </a:p>
         </p:txBody>
@@ -5967,7 +6471,7 @@
         <p:spPr>
           <a:xfrm>
             <a:off x="190366" y="5835585"/>
-            <a:ext cx="8763265" cy="646331"/>
+            <a:ext cx="8763265" cy="369332"/>
           </a:xfrm>
           <a:prstGeom prst="rect">
             <a:avLst/>
@@ -5981,15 +6485,15 @@
           <a:p>
             <a:r>
               <a:rPr lang="en-US" i="1" dirty="0"/>
-              <a:t>With the same 70/30 train-test split with the random forest model had an AUC of </a:t>
-            </a:r>
-            <a:r>
-              <a:rPr lang="en-US" i="1" dirty="0">
+              <a:t>With a 70/30 train-test split with were able to achieve an AUC of </a:t>
+            </a:r>
+            <a:r>
+              <a:rPr lang="en-US" dirty="0">
                 <a:highlight>
                   <a:srgbClr val="FFFF00"/>
                 </a:highlight>
               </a:rPr>
-              <a:t>0.7378</a:t>
+              <a:t>0.7148.</a:t>
             </a:r>
             <a:endParaRPr lang="en-US" i="1" dirty="0"/>
           </a:p>
@@ -6000,7 +6504,7 @@
           <p:cNvPr id="7" name="Picture 6">
             <a:extLst>
               <a:ext uri="{FF2B5EF4-FFF2-40B4-BE49-F238E27FC236}">
-                <a16:creationId xmlns:a16="http://schemas.microsoft.com/office/drawing/2014/main" id="{09D73BFC-E171-9C41-B0E6-660F3C351C36}"/>
+                <a16:creationId xmlns:a16="http://schemas.microsoft.com/office/drawing/2014/main" id="{1348F902-6A30-2F42-B539-35D0BB7331EC}"/>
               </a:ext>
             </a:extLst>
           </p:cNvPr>
@@ -6017,8 +6521,8 @@
         </p:blipFill>
         <p:spPr>
           <a:xfrm>
-            <a:off x="5689599" y="1588929"/>
-            <a:ext cx="2997200" cy="3924300"/>
+            <a:off x="5981699" y="1473200"/>
+            <a:ext cx="2705100" cy="3911600"/>
           </a:xfrm>
           <a:prstGeom prst="rect">
             <a:avLst/>
@@ -6030,7 +6534,7 @@
           <p:cNvPr id="8" name="Picture 7">
             <a:extLst>
               <a:ext uri="{FF2B5EF4-FFF2-40B4-BE49-F238E27FC236}">
-                <a16:creationId xmlns:a16="http://schemas.microsoft.com/office/drawing/2014/main" id="{AB156359-3B63-5B4A-9390-6BD73FA3AB84}"/>
+                <a16:creationId xmlns:a16="http://schemas.microsoft.com/office/drawing/2014/main" id="{9D8CE489-8716-DB48-AF85-6782456806EB}"/>
               </a:ext>
             </a:extLst>
           </p:cNvPr>
@@ -6047,8 +6551,8 @@
         </p:blipFill>
         <p:spPr>
           <a:xfrm>
-            <a:off x="457199" y="1588929"/>
-            <a:ext cx="4826000" cy="3162300"/>
+            <a:off x="587496" y="1473200"/>
+            <a:ext cx="4635500" cy="3162300"/>
           </a:xfrm>
           <a:prstGeom prst="rect">
             <a:avLst/>
@@ -6058,7 +6562,7 @@
     </p:spTree>
     <p:extLst>
       <p:ext uri="{BB962C8B-B14F-4D97-AF65-F5344CB8AC3E}">
-        <p14:creationId xmlns:p14="http://schemas.microsoft.com/office/powerpoint/2010/main" val="2475897239"/>
+        <p14:creationId xmlns:p14="http://schemas.microsoft.com/office/powerpoint/2010/main" val="1075104819"/>
       </p:ext>
     </p:extLst>
   </p:cSld>
@@ -6113,7 +6617,7 @@
           <a:p>
             <a:r>
               <a:rPr lang="en-US" dirty="0"/>
-              <a:t>Support Vector Machines</a:t>
+              <a:t>Logistic Regression</a:t>
             </a:r>
           </a:p>
         </p:txBody>
@@ -6175,7 +6679,7 @@
         <p:spPr>
           <a:xfrm>
             <a:off x="190366" y="5835585"/>
-            <a:ext cx="8763265" cy="646331"/>
+            <a:ext cx="8763265" cy="369332"/>
           </a:xfrm>
           <a:prstGeom prst="rect">
             <a:avLst/>
@@ -6189,15 +6693,15 @@
           <a:p>
             <a:r>
               <a:rPr lang="en-US" i="1" dirty="0"/>
-              <a:t>And finally, we have the results for the best performing model with an AUC of  </a:t>
-            </a:r>
-            <a:r>
-              <a:rPr lang="en-US" i="1" dirty="0">
+              <a:t>This model produced our lowest AUC of </a:t>
+            </a:r>
+            <a:r>
+              <a:rPr lang="en-US" dirty="0">
                 <a:highlight>
                   <a:srgbClr val="FFFF00"/>
                 </a:highlight>
               </a:rPr>
-              <a:t>0.7502.</a:t>
+              <a:t>0.6907.</a:t>
             </a:r>
             <a:endParaRPr lang="en-US" i="1" dirty="0"/>
           </a:p>
@@ -6208,7 +6712,7 @@
           <p:cNvPr id="3" name="Picture 2">
             <a:extLst>
               <a:ext uri="{FF2B5EF4-FFF2-40B4-BE49-F238E27FC236}">
-                <a16:creationId xmlns:a16="http://schemas.microsoft.com/office/drawing/2014/main" id="{35D9F868-0D9A-1D46-B39E-F4B8A0F81E35}"/>
+                <a16:creationId xmlns:a16="http://schemas.microsoft.com/office/drawing/2014/main" id="{4FF90320-1147-4743-A362-A2C1AADD4658}"/>
               </a:ext>
             </a:extLst>
           </p:cNvPr>
@@ -6225,8 +6729,8 @@
         </p:blipFill>
         <p:spPr>
           <a:xfrm>
-            <a:off x="5651499" y="1578780"/>
-            <a:ext cx="3035300" cy="4000500"/>
+            <a:off x="5724404" y="1466850"/>
+            <a:ext cx="2832100" cy="3924300"/>
           </a:xfrm>
           <a:prstGeom prst="rect">
             <a:avLst/>
@@ -6238,7 +6742,7 @@
           <p:cNvPr id="6" name="Picture 5">
             <a:extLst>
               <a:ext uri="{FF2B5EF4-FFF2-40B4-BE49-F238E27FC236}">
-                <a16:creationId xmlns:a16="http://schemas.microsoft.com/office/drawing/2014/main" id="{D4F0BB1A-F258-3345-9B5A-2A9C572764E9}"/>
+                <a16:creationId xmlns:a16="http://schemas.microsoft.com/office/drawing/2014/main" id="{61BBCCAE-8BA9-5D4A-9461-4B20A057B74D}"/>
               </a:ext>
             </a:extLst>
           </p:cNvPr>
@@ -6255,8 +6759,8 @@
         </p:blipFill>
         <p:spPr>
           <a:xfrm>
-            <a:off x="457199" y="1578780"/>
-            <a:ext cx="4851400" cy="3086100"/>
+            <a:off x="457199" y="1466850"/>
+            <a:ext cx="4864100" cy="3149600"/>
           </a:xfrm>
           <a:prstGeom prst="rect">
             <a:avLst/>
@@ -6266,7 +6770,7 @@
     </p:spTree>
     <p:extLst>
       <p:ext uri="{BB962C8B-B14F-4D97-AF65-F5344CB8AC3E}">
-        <p14:creationId xmlns:p14="http://schemas.microsoft.com/office/powerpoint/2010/main" val="2813423294"/>
+        <p14:creationId xmlns:p14="http://schemas.microsoft.com/office/powerpoint/2010/main" val="2116266125"/>
       </p:ext>
     </p:extLst>
   </p:cSld>

</xml_diff>

<commit_message>
correct typo in slide
</commit_message>
<xml_diff>
--- a/presentations/DS6306_Proj2_Final_Presentation.pptx
+++ b/presentations/DS6306_Proj2_Final_Presentation.pptx
@@ -6273,7 +6273,15 @@
             </a:r>
             <a:r>
               <a:rPr lang="en-US" dirty="0"/>
-              <a:t>10-fold Cross-Validated resampling with k = 15, the model was able to achieve an an AUC (Area under the Curve) of </a:t>
+              <a:t>10-fold Cross-Validated resampling with k = 15, the model was able to </a:t>
+            </a:r>
+            <a:r>
+              <a:rPr lang="en-US"/>
+              <a:t>achieve an </a:t>
+            </a:r>
+            <a:r>
+              <a:rPr lang="en-US" dirty="0"/>
+              <a:t>AUC (Area under the Curve) of </a:t>
             </a:r>
             <a:r>
               <a:rPr lang="en-US" dirty="0">

</xml_diff>